<commit_message>
Update slides and report based on last night's changes
</commit_message>
<xml_diff>
--- a/UI/result/Profiler_Slides.pptx
+++ b/UI/result/Profiler_Slides.pptx
@@ -13,14 +13,6 @@
   </p:handoutMasterIdLst>
   <p:sldIdLst>
     <p:sldId id="256" r:id="rId13"/>
-    <p:sldId id="257" r:id="rId14"/>
-    <p:sldId id="258" r:id="rId15"/>
-    <p:sldId id="259" r:id="rId16"/>
-    <p:sldId id="260" r:id="rId17"/>
-    <p:sldId id="261" r:id="rId18"/>
-    <p:sldId id="262" r:id="rId19"/>
-    <p:sldId id="263" r:id="rId20"/>
-    <p:sldId id="264" r:id="rId21"/>
   </p:sldIdLst>
   <p:sldSz cx="10058400" cy="7772400"/>
   <p:notesSz cx="7010400" cy="9372600"/>
@@ -43414,138 +43406,6 @@
           <a:lstStyle/>
           <a:p>
             <a:r>
-              <a:t>Overview</a:t>
-            </a:r>
-          </a:p>
-        </p:txBody>
-      </p:sp>
-      <p:sp>
-        <p:nvSpPr>
-          <p:cNvPr id="3" name="Text Placeholder 2"/>
-          <p:cNvSpPr>
-            <a:spLocks noGrp="1"/>
-          </p:cNvSpPr>
-          <p:nvPr>
-            <p:ph type="body" idx="14" sz="quarter"/>
-          </p:nvPr>
-        </p:nvSpPr>
-        <p:spPr/>
-        <p:txBody>
-          <a:bodyPr lIns="457200" tIns="228600" rIns="457200" bIns="228600"/>
-          <a:lstStyle/>
-          <a:p>
-            <a:pPr>
-              <a:spcBef>
-                <a:spcPts val="1000"/>
-              </a:spcBef>
-              <a:defRPr sz="1200"/>
-            </a:pPr>
-            <a:r>
-              <a:t>- **Founded:** April 1, 1976, by Steve Jobs, Steve Wozniak, and Ronald Wayne in Cupertino, California.</a:t>
-            </a:r>
-          </a:p>
-          <a:p>
-            <a:pPr>
-              <a:spcBef>
-                <a:spcPts val="1000"/>
-              </a:spcBef>
-              <a:defRPr sz="1200"/>
-            </a:pPr>
-            <a:r>
-              <a:t>- **Key Products:** iPhone, iPad, Mac, Apple Watch, AirPods, Apple TV, HomePod, operating systems (macOS, iOS, iPadOS, watchOS, tvOS), and services (Apple Music, Apple TV+, iCloud, Apple Arcade, Apple Pay, Apple News+).</a:t>
-            </a:r>
-          </a:p>
-          <a:p>
-            <a:pPr>
-              <a:spcBef>
-                <a:spcPts val="1000"/>
-              </a:spcBef>
-              <a:defRPr sz="1200"/>
-            </a:pPr>
-            <a:r>
-              <a:t>- **Monetization Model:** Hardware sales, services revenue, subscription services, App Store commissions, and accessory sales.</a:t>
-            </a:r>
-          </a:p>
-          <a:p>
-            <a:pPr>
-              <a:spcBef>
-                <a:spcPts val="1000"/>
-              </a:spcBef>
-              <a:defRPr sz="1200"/>
-            </a:pPr>
-            <a:r>
-              <a:t>- **Target Customers:** Consumers, professionals and enterprises, education sector, and developers.</a:t>
-            </a:r>
-          </a:p>
-          <a:p>
-            <a:pPr>
-              <a:spcBef>
-                <a:spcPts val="1000"/>
-              </a:spcBef>
-              <a:defRPr sz="1200"/>
-            </a:pPr>
-            <a:r>
-              <a:t>- **Ownership:** Publicly traded on NASDAQ (AAPL), owned by individual, institutional, and mutual fund investors, including Vanguard Group, BlackRock, and Berkshire Hathaway.</a:t>
-            </a:r>
-          </a:p>
-          <a:p>
-            <a:pPr>
-              <a:spcBef>
-                <a:spcPts val="1000"/>
-              </a:spcBef>
-              <a:defRPr sz="1200"/>
-            </a:pPr>
-            <a:r>
-              <a:t>- **Marquee Customers:** Widely used by major corporations, educational institutions, government agencies, health care facilities, and creative professionals globally.</a:t>
-            </a:r>
-          </a:p>
-          <a:p>
-            <a:pPr>
-              <a:spcBef>
-                <a:spcPts val="1000"/>
-              </a:spcBef>
-              <a:defRPr sz="1200"/>
-            </a:pPr>
-            <a:r>
-              <a:t>- **Sources:** Apple Inc. - About Us, SEC Filing Reports.</a:t>
-            </a:r>
-          </a:p>
-        </p:txBody>
-      </p:sp>
-    </p:spTree>
-  </p:cSld>
-  <p:clrMapOvr>
-    <a:masterClrMapping/>
-  </p:clrMapOvr>
-</p:sld>
-</file>
-
-<file path=ppt/slides/slide2.xml><?xml version="1.0" encoding="utf-8"?>
-<p:sld xmlns:a="http://schemas.openxmlformats.org/drawingml/2006/main" xmlns:p="http://schemas.openxmlformats.org/presentationml/2006/main" xmlns:r="http://schemas.openxmlformats.org/officeDocument/2006/relationships">
-  <p:cSld>
-    <p:spTree>
-      <p:nvGrpSpPr>
-        <p:cNvPr id="1" name=""/>
-        <p:cNvGrpSpPr/>
-        <p:nvPr/>
-      </p:nvGrpSpPr>
-      <p:grpSpPr/>
-      <p:sp>
-        <p:nvSpPr>
-          <p:cNvPr id="2" name="Title 1"/>
-          <p:cNvSpPr>
-            <a:spLocks noGrp="1"/>
-          </p:cNvSpPr>
-          <p:nvPr>
-            <p:ph type="title"/>
-          </p:nvPr>
-        </p:nvSpPr>
-        <p:spPr/>
-        <p:txBody>
-          <a:bodyPr/>
-          <a:lstStyle/>
-          <a:p>
-            <a:r>
               <a:t>Financials</a:t>
             </a:r>
           </a:p>
@@ -43563,90 +43423,14 @@
         </p:nvSpPr>
         <p:spPr/>
         <p:txBody>
-          <a:bodyPr lIns="457200" tIns="228600" rIns="457200" bIns="228600"/>
+          <a:bodyPr/>
           <a:lstStyle/>
-          <a:p>
-            <a:pPr>
-              <a:spcBef>
-                <a:spcPts val="1000"/>
-              </a:spcBef>
-              <a:defRPr sz="1200"/>
-            </a:pPr>
-            <a:r>
-              <a:t>- **Historical Performance**: Apple’s stock has shown significant growth, closing at ~$227.48 on Nov 7, 2024, driven by successful product launches and strong financial results.</a:t>
-            </a:r>
-          </a:p>
-          <a:p>
-            <a:pPr>
-              <a:spcBef>
-                <a:spcPts val="1000"/>
-              </a:spcBef>
-              <a:defRPr sz="1200"/>
-            </a:pPr>
-            <a:r>
-              <a:t>- **Stock Splits**: Conducted 7-for-1 split in June 2014 and 4-for-1 split in August 2020 to make shares more accessible.</a:t>
-            </a:r>
-          </a:p>
-          <a:p>
-            <a:pPr>
-              <a:spcBef>
-                <a:spcPts val="1000"/>
-              </a:spcBef>
-              <a:defRPr sz="1200"/>
-            </a:pPr>
-            <a:r>
-              <a:t>- **Market Influence**: Share price influenced by product announcements, earnings reports, market trends, and economic conditions.</a:t>
-            </a:r>
-          </a:p>
-          <a:p>
-            <a:pPr>
-              <a:spcBef>
-                <a:spcPts val="1000"/>
-              </a:spcBef>
-              <a:defRPr sz="1200"/>
-            </a:pPr>
-            <a:r>
-              <a:t>- **Valuation Multiples**: Key metrics include P/E, P/S, and P/B ratios, reflecting investor expectations and market valuation.</a:t>
-            </a:r>
-          </a:p>
-          <a:p>
-            <a:pPr>
-              <a:spcBef>
-                <a:spcPts val="1000"/>
-              </a:spcBef>
-              <a:defRPr sz="1200"/>
-            </a:pPr>
-            <a:r>
-              <a:t>- **Financial Profile**: Strong revenue from hardware and services, high profitability, significant cash flow, and well-managed debt.</a:t>
-            </a:r>
-          </a:p>
-          <a:p>
-            <a:pPr>
-              <a:spcBef>
-                <a:spcPts val="1000"/>
-              </a:spcBef>
-              <a:defRPr sz="1200"/>
-            </a:pPr>
-            <a:r>
-              <a:t>- **Equity Research Views**: Analysts provide target prices (e.g., $180-$200), ratings (buy, hold, sell), and earnings projections based on performance and market conditions.</a:t>
-            </a:r>
-          </a:p>
-          <a:p>
-            <a:pPr>
-              <a:spcBef>
-                <a:spcPts val="1000"/>
-              </a:spcBef>
-              <a:defRPr sz="1200"/>
-            </a:pPr>
-            <a:r>
-              <a:t>- **Private Company Valuation**: Methods include precedent capital raises, comparable company analysis, and strategic investments.</a:t>
-            </a:r>
-          </a:p>
+          <a:p/>
         </p:txBody>
       </p:sp>
       <p:pic>
         <p:nvPicPr>
-          <p:cNvPr id="4" name="Picture 3" descr="apple.png"/>
+          <p:cNvPr id="4" name="Picture 3" descr="GOOGL_cumret.png"/>
           <p:cNvPicPr>
             <a:picLocks noChangeAspect="1"/>
           </p:cNvPicPr>
@@ -43660,8 +43444,56 @@
         </p:blipFill>
         <p:spPr>
           <a:xfrm>
-            <a:off x="5486400" y="1371600"/>
-            <a:ext cx="3657600" cy="2020661"/>
+            <a:off x="914400" y="1371600"/>
+            <a:ext cx="3657600" cy="1371600"/>
+          </a:xfrm>
+          <a:prstGeom prst="rect">
+            <a:avLst/>
+          </a:prstGeom>
+        </p:spPr>
+      </p:pic>
+      <p:pic>
+        <p:nvPicPr>
+          <p:cNvPr id="5" name="Picture 4" descr="GOOGL_finsnap.png"/>
+          <p:cNvPicPr>
+            <a:picLocks noChangeAspect="1"/>
+          </p:cNvPicPr>
+          <p:nvPr/>
+        </p:nvPicPr>
+        <p:blipFill>
+          <a:blip r:embed="rId3"/>
+          <a:stretch>
+            <a:fillRect/>
+          </a:stretch>
+        </p:blipFill>
+        <p:spPr>
+          <a:xfrm>
+            <a:off x="914400" y="4114800"/>
+            <a:ext cx="3657600" cy="2438400"/>
+          </a:xfrm>
+          <a:prstGeom prst="rect">
+            <a:avLst/>
+          </a:prstGeom>
+        </p:spPr>
+      </p:pic>
+      <p:pic>
+        <p:nvPicPr>
+          <p:cNvPr id="6" name="Picture 5" descr="GOOGL_pie.png"/>
+          <p:cNvPicPr>
+            <a:picLocks noChangeAspect="1"/>
+          </p:cNvPicPr>
+          <p:nvPr/>
+        </p:nvPicPr>
+        <p:blipFill>
+          <a:blip r:embed="rId4"/>
+          <a:stretch>
+            <a:fillRect/>
+          </a:stretch>
+        </p:blipFill>
+        <p:spPr>
+          <a:xfrm>
+            <a:off x="5486400" y="914400"/>
+            <a:ext cx="3657600" cy="2926080"/>
           </a:xfrm>
           <a:prstGeom prst="rect">
             <a:avLst/>
@@ -43670,14 +43502,14 @@
       </p:pic>
       <p:graphicFrame>
         <p:nvGraphicFramePr>
-          <p:cNvPr id="5" name="Table 4"/>
+          <p:cNvPr id="7" name="Table 6"/>
           <p:cNvGraphicFramePr>
             <a:graphicFrameLocks noGrp="1"/>
           </p:cNvGraphicFramePr>
           <p:nvPr/>
         </p:nvGraphicFramePr>
         <p:xfrm>
-          <a:off x="5257800" y="3657600"/>
+          <a:off x="5029200" y="3657600"/>
           <a:ext cx="4572000" cy="1371600"/>
         </p:xfrm>
         <a:graphic>
@@ -43768,6 +43600,73 @@
                     <a:p>
                       <a:r>
                         <a:rPr sz="1200"/>
+                        <a:t>AAPL</a:t>
+                      </a:r>
+                    </a:p>
+                  </a:txBody>
+                  <a:tcPr/>
+                </a:tc>
+                <a:tc>
+                  <a:txBody>
+                    <a:bodyPr/>
+                    <a:lstStyle/>
+                    <a:p>
+                      <a:r>
+                        <a:rPr sz="1200"/>
+                        <a:t>$809.51BB</a:t>
+                      </a:r>
+                    </a:p>
+                  </a:txBody>
+                  <a:tcPr/>
+                </a:tc>
+                <a:tc>
+                  <a:txBody>
+                    <a:bodyPr/>
+                    <a:lstStyle/>
+                    <a:p>
+                      <a:r>
+                        <a:rPr sz="1200"/>
+                        <a:t>16.86</a:t>
+                      </a:r>
+                    </a:p>
+                  </a:txBody>
+                  <a:tcPr/>
+                </a:tc>
+                <a:tc>
+                  <a:txBody>
+                    <a:bodyPr/>
+                    <a:lstStyle/>
+                    <a:p>
+                      <a:r>
+                        <a:rPr sz="1200"/>
+                        <a:t>9.2</a:t>
+                      </a:r>
+                    </a:p>
+                  </a:txBody>
+                  <a:tcPr/>
+                </a:tc>
+                <a:tc>
+                  <a:txBody>
+                    <a:bodyPr/>
+                    <a:lstStyle/>
+                    <a:p>
+                      <a:r>
+                        <a:rPr sz="1200"/>
+                        <a:t>3.46</a:t>
+                      </a:r>
+                    </a:p>
+                  </a:txBody>
+                  <a:tcPr/>
+                </a:tc>
+              </a:tr>
+              <a:tr h="124690">
+                <a:tc>
+                  <a:txBody>
+                    <a:bodyPr/>
+                    <a:lstStyle/>
+                    <a:p>
+                      <a:r>
+                        <a:rPr sz="1200"/>
                         <a:t>GOOGL</a:t>
                       </a:r>
                     </a:p>
@@ -43820,7 +43719,7 @@
                     <a:p>
                       <a:r>
                         <a:rPr sz="1200"/>
-                        <a:t>.</a:t>
+                        <a:t>6.8</a:t>
                       </a:r>
                     </a:p>
                   </a:txBody>
@@ -43887,7 +43786,7 @@
                     <a:p>
                       <a:r>
                         <a:rPr sz="1200"/>
-                        <a:t>.</a:t>
+                        <a:t>6.77</a:t>
                       </a:r>
                     </a:p>
                   </a:txBody>
@@ -43954,7 +43853,7 @@
                     <a:p>
                       <a:r>
                         <a:rPr sz="1200"/>
-                        <a:t>.</a:t>
+                        <a:t>7.11</a:t>
                       </a:r>
                     </a:p>
                   </a:txBody>
@@ -44021,7 +43920,7 @@
                     <a:p>
                       <a:r>
                         <a:rPr sz="1200"/>
-                        <a:t>..</a:t>
+                        <a:t>13.24</a:t>
                       </a:r>
                     </a:p>
                   </a:txBody>
@@ -44088,7 +43987,7 @@
                     <a:p>
                       <a:r>
                         <a:rPr sz="1200"/>
-                        <a:t>.</a:t>
+                        <a:t>14.43</a:t>
                       </a:r>
                     </a:p>
                   </a:txBody>
@@ -44155,7 +44054,7 @@
                     <a:p>
                       <a:r>
                         <a:rPr sz="1200"/>
-                        <a:t>.</a:t>
+                        <a:t>3.35</a:t>
                       </a:r>
                     </a:p>
                   </a:txBody>
@@ -44222,7 +44121,7 @@
                     <a:p>
                       <a:r>
                         <a:rPr sz="1200"/>
-                        <a:t>.</a:t>
+                        <a:t>5.26</a:t>
                       </a:r>
                     </a:p>
                   </a:txBody>
@@ -44289,14 +44188,14 @@
                     <a:p>
                       <a:r>
                         <a:rPr sz="1200"/>
-                        <a:t>.</a:t>
+                        <a:t>5.48</a:t>
                       </a:r>
                     </a:p>
                   </a:txBody>
                   <a:tcPr/>
                 </a:tc>
               </a:tr>
-              <a:tr h="124690">
+              <a:tr h="124700">
                 <a:tc>
                   <a:txBody>
                     <a:bodyPr/>
@@ -44356,74 +44255,7 @@
                     <a:p>
                       <a:r>
                         <a:rPr sz="1200"/>
-                        <a:t>.</a:t>
-                      </a:r>
-                    </a:p>
-                  </a:txBody>
-                  <a:tcPr/>
-                </a:tc>
-              </a:tr>
-              <a:tr h="124700">
-                <a:tc>
-                  <a:txBody>
-                    <a:bodyPr/>
-                    <a:lstStyle/>
-                    <a:p>
-                      <a:r>
-                        <a:rPr sz="1200"/>
-                        <a:t>IBM</a:t>
-                      </a:r>
-                    </a:p>
-                  </a:txBody>
-                  <a:tcPr/>
-                </a:tc>
-                <a:tc>
-                  <a:txBody>
-                    <a:bodyPr/>
-                    <a:lstStyle/>
-                    <a:p>
-                      <a:r>
-                        <a:rPr sz="1200"/>
-                        <a:t>$142.43BB</a:t>
-                      </a:r>
-                    </a:p>
-                  </a:txBody>
-                  <a:tcPr/>
-                </a:tc>
-                <a:tc>
-                  <a:txBody>
-                    <a:bodyPr/>
-                    <a:lstStyle/>
-                    <a:p>
-                      <a:r>
-                        <a:rPr sz="1200"/>
-                        <a:t>10.67</a:t>
-                      </a:r>
-                    </a:p>
-                  </a:txBody>
-                  <a:tcPr/>
-                </a:tc>
-                <a:tc>
-                  <a:txBody>
-                    <a:bodyPr/>
-                    <a:lstStyle/>
-                    <a:p>
-                      <a:r>
-                        <a:rPr sz="1200"/>
-                        <a:t>6.11</a:t>
-                      </a:r>
-                    </a:p>
-                  </a:txBody>
-                  <a:tcPr/>
-                </a:tc>
-                <a:tc>
-                  <a:txBody>
-                    <a:bodyPr/>
-                    <a:lstStyle/>
-                    <a:p>
-                      <a:r>
-                        <a:rPr sz="1200"/>
-                        <a:t>.</a:t>
+                        <a:t>15.02</a:t>
                       </a:r>
                     </a:p>
                   </a:txBody>
@@ -44434,1121 +44266,6 @@
           </a:graphicData>
         </a:graphic>
       </p:graphicFrame>
-    </p:spTree>
-  </p:cSld>
-  <p:clrMapOvr>
-    <a:masterClrMapping/>
-  </p:clrMapOvr>
-</p:sld>
-</file>
-
-<file path=ppt/slides/slide3.xml><?xml version="1.0" encoding="utf-8"?>
-<p:sld xmlns:a="http://schemas.openxmlformats.org/drawingml/2006/main" xmlns:p="http://schemas.openxmlformats.org/presentationml/2006/main" xmlns:r="http://schemas.openxmlformats.org/officeDocument/2006/relationships">
-  <p:cSld>
-    <p:spTree>
-      <p:nvGrpSpPr>
-        <p:cNvPr id="1" name=""/>
-        <p:cNvGrpSpPr/>
-        <p:nvPr/>
-      </p:nvGrpSpPr>
-      <p:grpSpPr/>
-      <p:sp>
-        <p:nvSpPr>
-          <p:cNvPr id="2" name="Title 1"/>
-          <p:cNvSpPr>
-            <a:spLocks noGrp="1"/>
-          </p:cNvSpPr>
-          <p:nvPr>
-            <p:ph type="title"/>
-          </p:nvPr>
-        </p:nvSpPr>
-        <p:spPr/>
-        <p:txBody>
-          <a:bodyPr/>
-          <a:lstStyle/>
-          <a:p>
-            <a:r>
-              <a:t>Geographic Mix</a:t>
-            </a:r>
-          </a:p>
-        </p:txBody>
-      </p:sp>
-      <p:sp>
-        <p:nvSpPr>
-          <p:cNvPr id="3" name="Text Placeholder 2"/>
-          <p:cNvSpPr>
-            <a:spLocks noGrp="1"/>
-          </p:cNvSpPr>
-          <p:nvPr>
-            <p:ph type="body" idx="14" sz="quarter"/>
-          </p:nvPr>
-        </p:nvSpPr>
-        <p:spPr/>
-        <p:txBody>
-          <a:bodyPr lIns="457200" tIns="228600" rIns="457200" bIns="228600"/>
-          <a:lstStyle/>
-          <a:p>
-            <a:pPr>
-              <a:spcBef>
-                <a:spcPts val="1000"/>
-              </a:spcBef>
-              <a:defRPr sz="1200"/>
-            </a:pPr>
-            <a:r>
-              <a:t>- **Headquarters:** Apple Inc. is based in Cupertino, California, at the Apple Park campus, known for its innovative ring-shaped design.</a:t>
-            </a:r>
-          </a:p>
-          <a:p>
-            <a:pPr>
-              <a:spcBef>
-                <a:spcPts val="1000"/>
-              </a:spcBef>
-              <a:defRPr sz="1200"/>
-            </a:pPr>
-            <a:r>
-              <a:t>- **North America:** Major offices in Cupertino, CA (HQ), Austin, TX, and numerous retail stores across the US and Canada.</a:t>
-            </a:r>
-          </a:p>
-          <a:p>
-            <a:pPr>
-              <a:spcBef>
-                <a:spcPts val="1000"/>
-              </a:spcBef>
-              <a:defRPr sz="1200"/>
-            </a:pPr>
-            <a:r>
-              <a:t>- **Europe:** Key offices in Cork, Ireland; Munich, Germany; London, UK; and retail stores in major cities like Paris, Berlin, Madrid, and Milan.</a:t>
-            </a:r>
-          </a:p>
-          <a:p>
-            <a:pPr>
-              <a:spcBef>
-                <a:spcPts val="1000"/>
-              </a:spcBef>
-              <a:defRPr sz="1200"/>
-            </a:pPr>
-            <a:r>
-              <a:t>- **Greater China:** Operational hubs in Shanghai and Beijing, with multiple retail stores in cities including Shenzhen and Hong Kong.</a:t>
-            </a:r>
-          </a:p>
-          <a:p>
-            <a:pPr>
-              <a:spcBef>
-                <a:spcPts val="1000"/>
-              </a:spcBef>
-              <a:defRPr sz="1200"/>
-            </a:pPr>
-            <a:r>
-              <a:t>- **Japan:** Tokyo office handling sales, marketing, and strategic partnerships.</a:t>
-            </a:r>
-          </a:p>
-          <a:p>
-            <a:pPr>
-              <a:spcBef>
-                <a:spcPts val="1000"/>
-              </a:spcBef>
-              <a:defRPr sz="1200"/>
-            </a:pPr>
-            <a:r>
-              <a:t>- **Rest of Asia Pacific:** Regional hub in Singapore, maps development office in Hyderabad, India, and retail stores in Australia and South Korea.</a:t>
-            </a:r>
-          </a:p>
-          <a:p>
-            <a:pPr>
-              <a:spcBef>
-                <a:spcPts val="1000"/>
-              </a:spcBef>
-              <a:defRPr sz="1200"/>
-            </a:pPr>
-            <a:r>
-              <a:t>- **Retail Network:** Significant global retail presence with flagship stores in New York City, San Francisco, Tokyo, Paris, and Dubai, enhancing direct consumer engagement.</a:t>
-            </a:r>
-          </a:p>
-        </p:txBody>
-      </p:sp>
-    </p:spTree>
-  </p:cSld>
-  <p:clrMapOvr>
-    <a:masterClrMapping/>
-  </p:clrMapOvr>
-</p:sld>
-</file>
-
-<file path=ppt/slides/slide4.xml><?xml version="1.0" encoding="utf-8"?>
-<p:sld xmlns:a="http://schemas.openxmlformats.org/drawingml/2006/main" xmlns:p="http://schemas.openxmlformats.org/presentationml/2006/main" xmlns:r="http://schemas.openxmlformats.org/officeDocument/2006/relationships">
-  <p:cSld>
-    <p:spTree>
-      <p:nvGrpSpPr>
-        <p:cNvPr id="1" name=""/>
-        <p:cNvGrpSpPr/>
-        <p:nvPr/>
-      </p:nvGrpSpPr>
-      <p:grpSpPr/>
-      <p:sp>
-        <p:nvSpPr>
-          <p:cNvPr id="2" name="Title 1"/>
-          <p:cNvSpPr>
-            <a:spLocks noGrp="1"/>
-          </p:cNvSpPr>
-          <p:nvPr>
-            <p:ph type="title"/>
-          </p:nvPr>
-        </p:nvSpPr>
-        <p:spPr/>
-        <p:txBody>
-          <a:bodyPr/>
-          <a:lstStyle/>
-          <a:p>
-            <a:r>
-              <a:t>Management</a:t>
-            </a:r>
-          </a:p>
-        </p:txBody>
-      </p:sp>
-      <p:sp>
-        <p:nvSpPr>
-          <p:cNvPr id="3" name="Text Placeholder 2"/>
-          <p:cNvSpPr>
-            <a:spLocks noGrp="1"/>
-          </p:cNvSpPr>
-          <p:nvPr>
-            <p:ph type="body" idx="14" sz="quarter"/>
-          </p:nvPr>
-        </p:nvSpPr>
-        <p:spPr/>
-        <p:txBody>
-          <a:bodyPr lIns="457200" tIns="228600" rIns="457200" bIns="228600"/>
-          <a:lstStyle/>
-          <a:p>
-            <a:pPr>
-              <a:spcBef>
-                <a:spcPts val="1000"/>
-              </a:spcBef>
-              <a:defRPr sz="1200"/>
-            </a:pPr>
-            <a:r>
-              <a:t>- **Tim Cook** – CEO since 2011, previously COO, responsible for worldwide sales and operations.</a:t>
-            </a:r>
-          </a:p>
-          <a:p>
-            <a:pPr>
-              <a:spcBef>
-                <a:spcPts val="1000"/>
-              </a:spcBef>
-              <a:defRPr sz="1200"/>
-            </a:pPr>
-            <a:r>
-              <a:t>- **Luca Maestri** – CFO and Senior VP since 2014, oversees financial planning, investor relations, and more.</a:t>
-            </a:r>
-          </a:p>
-          <a:p>
-            <a:pPr>
-              <a:spcBef>
-                <a:spcPts val="1000"/>
-              </a:spcBef>
-              <a:defRPr sz="1200"/>
-            </a:pPr>
-            <a:r>
-              <a:t>- **Jeff Williams** – COO since 2015, manages supply chain, service/support, and social responsibility.</a:t>
-            </a:r>
-          </a:p>
-          <a:p>
-            <a:pPr>
-              <a:spcBef>
-                <a:spcPts val="1000"/>
-              </a:spcBef>
-              <a:defRPr sz="1200"/>
-            </a:pPr>
-            <a:r>
-              <a:t>- **Katherine Adams** – Senior VP and General Counsel since 2017, handles all legal matters globally.</a:t>
-            </a:r>
-          </a:p>
-          <a:p>
-            <a:pPr>
-              <a:spcBef>
-                <a:spcPts val="1000"/>
-              </a:spcBef>
-              <a:defRPr sz="1200"/>
-            </a:pPr>
-            <a:r>
-              <a:t>- **Deirdre O’Brien** – Senior VP of Retail + People, manages global retail strategy and HR operations.</a:t>
-            </a:r>
-          </a:p>
-          <a:p>
-            <a:pPr>
-              <a:spcBef>
-                <a:spcPts val="1000"/>
-              </a:spcBef>
-              <a:defRPr sz="1200"/>
-            </a:pPr>
-            <a:r>
-              <a:t>- **Greg Joswiak** – Senior VP of Worldwide Marketing since 2020, responsible for product management and marketing.</a:t>
-            </a:r>
-          </a:p>
-          <a:p>
-            <a:pPr>
-              <a:spcBef>
-                <a:spcPts val="1000"/>
-              </a:spcBef>
-              <a:defRPr sz="1200"/>
-            </a:pPr>
-            <a:r>
-              <a:t>- **John Ternus** – Senior VP of Hardware Engineering since 2021, oversees hardware development.</a:t>
-            </a:r>
-          </a:p>
-        </p:txBody>
-      </p:sp>
-    </p:spTree>
-  </p:cSld>
-  <p:clrMapOvr>
-    <a:masterClrMapping/>
-  </p:clrMapOvr>
-</p:sld>
-</file>
-
-<file path=ppt/slides/slide5.xml><?xml version="1.0" encoding="utf-8"?>
-<p:sld xmlns:a="http://schemas.openxmlformats.org/drawingml/2006/main" xmlns:p="http://schemas.openxmlformats.org/presentationml/2006/main" xmlns:r="http://schemas.openxmlformats.org/officeDocument/2006/relationships">
-  <p:cSld>
-    <p:spTree>
-      <p:nvGrpSpPr>
-        <p:cNvPr id="1" name=""/>
-        <p:cNvGrpSpPr/>
-        <p:nvPr/>
-      </p:nvGrpSpPr>
-      <p:grpSpPr/>
-      <p:sp>
-        <p:nvSpPr>
-          <p:cNvPr id="2" name="Title 1"/>
-          <p:cNvSpPr>
-            <a:spLocks noGrp="1"/>
-          </p:cNvSpPr>
-          <p:nvPr>
-            <p:ph type="title"/>
-          </p:nvPr>
-        </p:nvSpPr>
-        <p:spPr/>
-        <p:txBody>
-          <a:bodyPr/>
-          <a:lstStyle/>
-          <a:p>
-            <a:r>
-              <a:t>Recent News</a:t>
-            </a:r>
-          </a:p>
-        </p:txBody>
-      </p:sp>
-      <p:sp>
-        <p:nvSpPr>
-          <p:cNvPr id="3" name="Text Placeholder 2"/>
-          <p:cNvSpPr>
-            <a:spLocks noGrp="1"/>
-          </p:cNvSpPr>
-          <p:nvPr>
-            <p:ph type="body" idx="14" sz="quarter"/>
-          </p:nvPr>
-        </p:nvSpPr>
-        <p:spPr/>
-        <p:txBody>
-          <a:bodyPr lIns="457200" tIns="228600" rIns="457200" bIns="228600"/>
-          <a:lstStyle/>
-          <a:p>
-            <a:pPr>
-              <a:spcBef>
-                <a:spcPts val="1000"/>
-              </a:spcBef>
-              <a:defRPr sz="1200"/>
-            </a:pPr>
-            <a:r>
-              <a:t>- **Product Announcements:**</a:t>
-            </a:r>
-          </a:p>
-          <a:p>
-            <a:pPr>
-              <a:spcBef>
-                <a:spcPts val="1000"/>
-              </a:spcBef>
-              <a:defRPr sz="1200"/>
-            </a:pPr>
-            <a:r>
-              <a:t>  - iPhone 13 series with enhanced camera, battery, and processing power.</a:t>
-            </a:r>
-          </a:p>
-          <a:p>
-            <a:pPr>
-              <a:spcBef>
-                <a:spcPts val="1000"/>
-              </a:spcBef>
-              <a:defRPr sz="1200"/>
-            </a:pPr>
-            <a:r>
-              <a:t>  - New iPads and Macs featuring the advanced M1 chip.</a:t>
-            </a:r>
-          </a:p>
-          <a:p>
-            <a:pPr>
-              <a:spcBef>
-                <a:spcPts val="1000"/>
-              </a:spcBef>
-              <a:defRPr sz="1200"/>
-            </a:pPr>
-          </a:p>
-          <a:p>
-            <a:pPr>
-              <a:spcBef>
-                <a:spcPts val="1000"/>
-              </a:spcBef>
-              <a:defRPr sz="1200"/>
-            </a:pPr>
-            <a:r>
-              <a:t>- **Financial Performance:**</a:t>
-            </a:r>
-          </a:p>
-          <a:p>
-            <a:pPr>
-              <a:spcBef>
-                <a:spcPts val="1000"/>
-              </a:spcBef>
-              <a:defRPr sz="1200"/>
-            </a:pPr>
-            <a:r>
-              <a:t>  - Record-breaking quarterly revenues despite supply chain challenges.</a:t>
-            </a:r>
-          </a:p>
-          <a:p>
-            <a:pPr>
-              <a:spcBef>
-                <a:spcPts val="1000"/>
-              </a:spcBef>
-              <a:defRPr sz="1200"/>
-            </a:pPr>
-            <a:r>
-              <a:t>  - Consistent revenue and earnings growth, surpassing Wall Street expectations.</a:t>
-            </a:r>
-          </a:p>
-          <a:p>
-            <a:pPr>
-              <a:spcBef>
-                <a:spcPts val="1000"/>
-              </a:spcBef>
-              <a:defRPr sz="1200"/>
-            </a:pPr>
-          </a:p>
-          <a:p>
-            <a:pPr>
-              <a:spcBef>
-                <a:spcPts val="1000"/>
-              </a:spcBef>
-              <a:defRPr sz="1200"/>
-            </a:pPr>
-            <a:r>
-              <a:t>- **Legal and Regulatory Matters:**</a:t>
-            </a:r>
-          </a:p>
-          <a:p>
-            <a:pPr>
-              <a:spcBef>
-                <a:spcPts val="1000"/>
-              </a:spcBef>
-              <a:defRPr sz="1200"/>
-            </a:pPr>
-            <a:r>
-              <a:t>  - Ongoing litigation with Epic Games over App Store commissions.</a:t>
-            </a:r>
-          </a:p>
-          <a:p>
-            <a:pPr>
-              <a:spcBef>
-                <a:spcPts val="1000"/>
-              </a:spcBef>
-              <a:defRPr sz="1200"/>
-            </a:pPr>
-            <a:r>
-              <a:t>  - Facing various antitrust investigations and lawsuits.</a:t>
-            </a:r>
-          </a:p>
-          <a:p>
-            <a:pPr>
-              <a:spcBef>
-                <a:spcPts val="1000"/>
-              </a:spcBef>
-              <a:defRPr sz="1200"/>
-            </a:pPr>
-          </a:p>
-          <a:p>
-            <a:pPr>
-              <a:spcBef>
-                <a:spcPts val="1000"/>
-              </a:spcBef>
-              <a:defRPr sz="1200"/>
-            </a:pPr>
-            <a:r>
-              <a:t>- **Stock Price Growth:**</a:t>
-            </a:r>
-          </a:p>
-          <a:p>
-            <a:pPr>
-              <a:spcBef>
-                <a:spcPts val="1000"/>
-              </a:spcBef>
-              <a:defRPr sz="1200"/>
-            </a:pPr>
-            <a:r>
-              <a:t>  - Significant growth from $20 in 2014 to over $227 in 2024.</a:t>
-            </a:r>
-          </a:p>
-          <a:p>
-            <a:pPr>
-              <a:spcBef>
-                <a:spcPts val="1000"/>
-              </a:spcBef>
-              <a:defRPr sz="1200"/>
-            </a:pPr>
-            <a:r>
-              <a:t>  - 4-for-1 stock split in August 2020 and regular dividends.</a:t>
-            </a:r>
-          </a:p>
-          <a:p>
-            <a:pPr>
-              <a:spcBef>
-                <a:spcPts val="1000"/>
-              </a:spcBef>
-              <a:defRPr sz="1200"/>
-            </a:pPr>
-          </a:p>
-          <a:p>
-            <a:pPr>
-              <a:spcBef>
-                <a:spcPts val="1000"/>
-              </a:spcBef>
-              <a:defRPr sz="1200"/>
-            </a:pPr>
-            <a:r>
-              <a:t>- **Profitability:**</a:t>
-            </a:r>
-          </a:p>
-          <a:p>
-            <a:pPr>
-              <a:spcBef>
-                <a:spcPts val="1000"/>
-              </a:spcBef>
-              <a:defRPr sz="1200"/>
-            </a:pPr>
-            <a:r>
-              <a:t>  - Strong revenue and net income growth, high gross and net margins.</a:t>
-            </a:r>
-          </a:p>
-          <a:p>
-            <a:pPr>
-              <a:spcBef>
-                <a:spcPts val="1000"/>
-              </a:spcBef>
-              <a:defRPr sz="1200"/>
-            </a:pPr>
-            <a:r>
-              <a:t>  - Extensive cash reserves for innovation and shareholder returns.</a:t>
-            </a:r>
-          </a:p>
-          <a:p>
-            <a:pPr>
-              <a:spcBef>
-                <a:spcPts val="1000"/>
-              </a:spcBef>
-              <a:defRPr sz="1200"/>
-            </a:pPr>
-          </a:p>
-          <a:p>
-            <a:pPr>
-              <a:spcBef>
-                <a:spcPts val="1000"/>
-              </a:spcBef>
-              <a:defRPr sz="1200"/>
-            </a:pPr>
-            <a:r>
-              <a:t>- **Material Change in Business Operations:**</a:t>
-            </a:r>
-          </a:p>
-          <a:p>
-            <a:pPr>
-              <a:spcBef>
-                <a:spcPts val="1000"/>
-              </a:spcBef>
-              <a:defRPr sz="1200"/>
-            </a:pPr>
-            <a:r>
-              <a:t>  - Transition to custom M1 chips, enhancing performance.</a:t>
-            </a:r>
-          </a:p>
-          <a:p>
-            <a:pPr>
-              <a:spcBef>
-                <a:spcPts val="1000"/>
-              </a:spcBef>
-              <a:defRPr sz="1200"/>
-            </a:pPr>
-            <a:r>
-              <a:t>  - Expansion of services like Apple Music, Apple TV+, and iCloud.</a:t>
-            </a:r>
-          </a:p>
-          <a:p>
-            <a:pPr>
-              <a:spcBef>
-                <a:spcPts val="1000"/>
-              </a:spcBef>
-              <a:defRPr sz="1200"/>
-            </a:pPr>
-          </a:p>
-          <a:p>
-            <a:pPr>
-              <a:spcBef>
-                <a:spcPts val="1000"/>
-              </a:spcBef>
-              <a:defRPr sz="1200"/>
-            </a:pPr>
-            <a:r>
-              <a:t>- **Recent Stock Price Data (November 2024):**</a:t>
-            </a:r>
-          </a:p>
-          <a:p>
-            <a:pPr>
-              <a:spcBef>
-                <a:spcPts val="1000"/>
-              </a:spcBef>
-              <a:defRPr sz="1200"/>
-            </a:pPr>
-            <a:r>
-              <a:t>  - Recent closing prices around $227, showing resilience and investor confidence.</a:t>
-            </a:r>
-          </a:p>
-        </p:txBody>
-      </p:sp>
-    </p:spTree>
-  </p:cSld>
-  <p:clrMapOvr>
-    <a:masterClrMapping/>
-  </p:clrMapOvr>
-</p:sld>
-</file>
-
-<file path=ppt/slides/slide6.xml><?xml version="1.0" encoding="utf-8"?>
-<p:sld xmlns:a="http://schemas.openxmlformats.org/drawingml/2006/main" xmlns:p="http://schemas.openxmlformats.org/presentationml/2006/main" xmlns:r="http://schemas.openxmlformats.org/officeDocument/2006/relationships">
-  <p:cSld>
-    <p:spTree>
-      <p:nvGrpSpPr>
-        <p:cNvPr id="1" name=""/>
-        <p:cNvGrpSpPr/>
-        <p:nvPr/>
-      </p:nvGrpSpPr>
-      <p:grpSpPr/>
-      <p:sp>
-        <p:nvSpPr>
-          <p:cNvPr id="2" name="Title 1"/>
-          <p:cNvSpPr>
-            <a:spLocks noGrp="1"/>
-          </p:cNvSpPr>
-          <p:nvPr>
-            <p:ph type="title"/>
-          </p:nvPr>
-        </p:nvSpPr>
-        <p:spPr/>
-        <p:txBody>
-          <a:bodyPr/>
-          <a:lstStyle/>
-          <a:p>
-            <a:r>
-              <a:t>M&amp;A Profile</a:t>
-            </a:r>
-          </a:p>
-        </p:txBody>
-      </p:sp>
-      <p:sp>
-        <p:nvSpPr>
-          <p:cNvPr id="3" name="Text Placeholder 2"/>
-          <p:cNvSpPr>
-            <a:spLocks noGrp="1"/>
-          </p:cNvSpPr>
-          <p:nvPr>
-            <p:ph type="body" idx="14" sz="quarter"/>
-          </p:nvPr>
-        </p:nvSpPr>
-        <p:spPr/>
-        <p:txBody>
-          <a:bodyPr lIns="457200" tIns="228600" rIns="457200" bIns="228600"/>
-          <a:lstStyle/>
-          <a:p>
-            <a:pPr>
-              <a:spcBef>
-                <a:spcPts val="1000"/>
-              </a:spcBef>
-              <a:defRPr sz="1200"/>
-            </a:pPr>
-            <a:r>
-              <a:t>- No verified reports of Apple completing any M&amp;A transactions in 2023.</a:t>
-            </a:r>
-          </a:p>
-          <a:p>
-            <a:pPr>
-              <a:spcBef>
-                <a:spcPts val="1000"/>
-              </a:spcBef>
-              <a:defRPr sz="1200"/>
-            </a:pPr>
-            <a:r>
-              <a:t>- No significant announcements of new mergers or acquisitions by Apple in 2023.</a:t>
-            </a:r>
-          </a:p>
-          <a:p>
-            <a:pPr>
-              <a:spcBef>
-                <a:spcPts val="1000"/>
-              </a:spcBef>
-              <a:defRPr sz="1200"/>
-            </a:pPr>
-            <a:r>
-              <a:t>- No public statements about terminated M&amp;A deals involving Apple in 2023.</a:t>
-            </a:r>
-          </a:p>
-          <a:p>
-            <a:pPr>
-              <a:spcBef>
-                <a:spcPts val="1000"/>
-              </a:spcBef>
-              <a:defRPr sz="1200"/>
-            </a:pPr>
-            <a:r>
-              <a:t>- Apple has not indicated plans to sell itself or any of its divisions in 2023.</a:t>
-            </a:r>
-          </a:p>
-          <a:p>
-            <a:pPr>
-              <a:spcBef>
-                <a:spcPts val="1000"/>
-              </a:spcBef>
-              <a:defRPr sz="1200"/>
-            </a:pPr>
-            <a:r>
-              <a:t>- No official announcements from Apple about plans to acquire other companies or assets in 2023.</a:t>
-            </a:r>
-          </a:p>
-          <a:p>
-            <a:pPr>
-              <a:spcBef>
-                <a:spcPts val="1000"/>
-              </a:spcBef>
-              <a:defRPr sz="1200"/>
-            </a:pPr>
-            <a:r>
-              <a:t>- The absence of M&amp;A activity may suggest a focus on organic growth and innovation.</a:t>
-            </a:r>
-          </a:p>
-          <a:p>
-            <a:pPr>
-              <a:spcBef>
-                <a:spcPts val="1000"/>
-              </a:spcBef>
-              <a:defRPr sz="1200"/>
-            </a:pPr>
-            <a:r>
-              <a:t>- Regularly check credible sources like Bloomberg, Reuters, and SEC filings for updates on Apple's strategic moves.</a:t>
-            </a:r>
-          </a:p>
-        </p:txBody>
-      </p:sp>
-    </p:spTree>
-  </p:cSld>
-  <p:clrMapOvr>
-    <a:masterClrMapping/>
-  </p:clrMapOvr>
-</p:sld>
-</file>
-
-<file path=ppt/slides/slide7.xml><?xml version="1.0" encoding="utf-8"?>
-<p:sld xmlns:a="http://schemas.openxmlformats.org/drawingml/2006/main" xmlns:p="http://schemas.openxmlformats.org/presentationml/2006/main" xmlns:r="http://schemas.openxmlformats.org/officeDocument/2006/relationships">
-  <p:cSld>
-    <p:spTree>
-      <p:nvGrpSpPr>
-        <p:cNvPr id="1" name=""/>
-        <p:cNvGrpSpPr/>
-        <p:nvPr/>
-      </p:nvGrpSpPr>
-      <p:grpSpPr/>
-      <p:sp>
-        <p:nvSpPr>
-          <p:cNvPr id="2" name="Title 1"/>
-          <p:cNvSpPr>
-            <a:spLocks noGrp="1"/>
-          </p:cNvSpPr>
-          <p:nvPr>
-            <p:ph type="title"/>
-          </p:nvPr>
-        </p:nvSpPr>
-        <p:spPr/>
-        <p:txBody>
-          <a:bodyPr/>
-          <a:lstStyle/>
-          <a:p>
-            <a:r>
-              <a:t>Miscellanea</a:t>
-            </a:r>
-          </a:p>
-        </p:txBody>
-      </p:sp>
-      <p:sp>
-        <p:nvSpPr>
-          <p:cNvPr id="3" name="Text Placeholder 2"/>
-          <p:cNvSpPr>
-            <a:spLocks noGrp="1"/>
-          </p:cNvSpPr>
-          <p:nvPr>
-            <p:ph type="body" idx="14" sz="quarter"/>
-          </p:nvPr>
-        </p:nvSpPr>
-        <p:spPr/>
-        <p:txBody>
-          <a:bodyPr lIns="457200" tIns="228600" rIns="457200" bIns="228600"/>
-          <a:lstStyle/>
-          <a:p>
-            <a:pPr>
-              <a:spcBef>
-                <a:spcPts val="1000"/>
-              </a:spcBef>
-              <a:defRPr sz="1200"/>
-            </a:pPr>
-            <a:r>
-              <a:t>- **Smartphones**: Competes with Samsung, Huawei, Google, and Xiaomi in the premium and budget-friendly segments.</a:t>
-            </a:r>
-          </a:p>
-          <a:p>
-            <a:pPr>
-              <a:spcBef>
-                <a:spcPts val="1000"/>
-              </a:spcBef>
-              <a:defRPr sz="1200"/>
-            </a:pPr>
-            <a:r>
-              <a:t>- **Computers**: Faces competition from Microsoft (Surface), Dell (XPS, Alienware), and HP (Spectre) in high-end laptops and desktops.</a:t>
-            </a:r>
-          </a:p>
-          <a:p>
-            <a:pPr>
-              <a:spcBef>
-                <a:spcPts val="1000"/>
-              </a:spcBef>
-              <a:defRPr sz="1200"/>
-            </a:pPr>
-            <a:r>
-              <a:t>- **Tablets**: Competes with Samsung (Galaxy Tab), Microsoft (Surface Pro/Go), and Amazon (Kindle Fire).</a:t>
-            </a:r>
-          </a:p>
-          <a:p>
-            <a:pPr>
-              <a:spcBef>
-                <a:spcPts val="1000"/>
-              </a:spcBef>
-              <a:defRPr sz="1200"/>
-            </a:pPr>
-            <a:r>
-              <a:t>- **Wearables**: Rivals include Fitbit, Samsung (Galaxy Watch), and Garmin in the smartwatch and fitness tracker markets.</a:t>
-            </a:r>
-          </a:p>
-          <a:p>
-            <a:pPr>
-              <a:spcBef>
-                <a:spcPts val="1000"/>
-              </a:spcBef>
-              <a:defRPr sz="1200"/>
-            </a:pPr>
-            <a:r>
-              <a:t>- **Streaming Services**: Apple TV+ competes with Netflix, Amazon Prime Video, and Disney+.</a:t>
-            </a:r>
-          </a:p>
-          <a:p>
-            <a:pPr>
-              <a:spcBef>
-                <a:spcPts val="1000"/>
-              </a:spcBef>
-              <a:defRPr sz="1200"/>
-            </a:pPr>
-            <a:r>
-              <a:t>- **Music Services**: Apple Music faces competition from Spotify, Amazon Music, and YouTube Music.</a:t>
-            </a:r>
-          </a:p>
-          <a:p>
-            <a:pPr>
-              <a:spcBef>
-                <a:spcPts val="1000"/>
-              </a:spcBef>
-              <a:defRPr sz="1200"/>
-            </a:pPr>
-            <a:r>
-              <a:t>- **Market Size**: Addressable markets include smartphones ($520B by 2025), personal computing ($200B in 2021), tablets (160M units in 2021), wearables ($70B in 2021), streaming services ($150B by 2026), and music streaming ($75B by 2027).</a:t>
-            </a:r>
-          </a:p>
-        </p:txBody>
-      </p:sp>
-    </p:spTree>
-  </p:cSld>
-  <p:clrMapOvr>
-    <a:masterClrMapping/>
-  </p:clrMapOvr>
-</p:sld>
-</file>
-
-<file path=ppt/slides/slide8.xml><?xml version="1.0" encoding="utf-8"?>
-<p:sld xmlns:a="http://schemas.openxmlformats.org/drawingml/2006/main" xmlns:p="http://schemas.openxmlformats.org/presentationml/2006/main" xmlns:r="http://schemas.openxmlformats.org/officeDocument/2006/relationships">
-  <p:cSld>
-    <p:spTree>
-      <p:nvGrpSpPr>
-        <p:cNvPr id="1" name=""/>
-        <p:cNvGrpSpPr/>
-        <p:nvPr/>
-      </p:nvGrpSpPr>
-      <p:grpSpPr/>
-      <p:sp>
-        <p:nvSpPr>
-          <p:cNvPr id="2" name="Title 1"/>
-          <p:cNvSpPr>
-            <a:spLocks noGrp="1"/>
-          </p:cNvSpPr>
-          <p:nvPr>
-            <p:ph type="title"/>
-          </p:nvPr>
-        </p:nvSpPr>
-        <p:spPr/>
-        <p:txBody>
-          <a:bodyPr/>
-          <a:lstStyle/>
-          <a:p>
-            <a:r>
-              <a:t>Discounted Cash Flow Analysis</a:t>
-            </a:r>
-          </a:p>
-        </p:txBody>
-      </p:sp>
-      <p:sp>
-        <p:nvSpPr>
-          <p:cNvPr id="3" name="Text Placeholder 2"/>
-          <p:cNvSpPr>
-            <a:spLocks noGrp="1"/>
-          </p:cNvSpPr>
-          <p:nvPr>
-            <p:ph type="body" idx="14" sz="quarter"/>
-          </p:nvPr>
-        </p:nvSpPr>
-        <p:spPr/>
-        <p:txBody>
-          <a:bodyPr lIns="457200" tIns="228600" rIns="457200" bIns="228600"/>
-          <a:lstStyle/>
-          <a:p>
-            <a:pPr>
-              <a:spcBef>
-                <a:spcPts val="1000"/>
-              </a:spcBef>
-              <a:defRPr sz="1200"/>
-            </a:pPr>
-            <a:r>
-              <a:t>- Overview of DFC (Discounted Free Cash Flow) analysis methodology</a:t>
-            </a:r>
-          </a:p>
-          <a:p>
-            <a:pPr>
-              <a:spcBef>
-                <a:spcPts val="1000"/>
-              </a:spcBef>
-              <a:defRPr sz="1200"/>
-            </a:pPr>
-            <a:r>
-              <a:t>- Steps to project future free cash flows</a:t>
-            </a:r>
-          </a:p>
-          <a:p>
-            <a:pPr>
-              <a:spcBef>
-                <a:spcPts val="1000"/>
-              </a:spcBef>
-              <a:defRPr sz="1200"/>
-            </a:pPr>
-            <a:r>
-              <a:t>- Calculation of discount rate using WACC (Weighted Average Cost of Capital)</a:t>
-            </a:r>
-          </a:p>
-          <a:p>
-            <a:pPr>
-              <a:spcBef>
-                <a:spcPts val="1000"/>
-              </a:spcBef>
-              <a:defRPr sz="1200"/>
-            </a:pPr>
-            <a:r>
-              <a:t>- Present value of projected free cash flows</a:t>
-            </a:r>
-          </a:p>
-          <a:p>
-            <a:pPr>
-              <a:spcBef>
-                <a:spcPts val="1000"/>
-              </a:spcBef>
-              <a:defRPr sz="1200"/>
-            </a:pPr>
-            <a:r>
-              <a:t>- Terminal value estimation and its present value</a:t>
-            </a:r>
-          </a:p>
-          <a:p>
-            <a:pPr>
-              <a:spcBef>
-                <a:spcPts val="1000"/>
-              </a:spcBef>
-              <a:defRPr sz="1200"/>
-            </a:pPr>
-            <a:r>
-              <a:t>- Summation of present values to determine enterprise value</a:t>
-            </a:r>
-          </a:p>
-          <a:p>
-            <a:pPr>
-              <a:spcBef>
-                <a:spcPts val="1000"/>
-              </a:spcBef>
-              <a:defRPr sz="1200"/>
-            </a:pPr>
-            <a:r>
-              <a:t>- Sensitivity analysis to assess impact of key assumptions on valuation</a:t>
-            </a:r>
-          </a:p>
-        </p:txBody>
-      </p:sp>
-    </p:spTree>
-  </p:cSld>
-  <p:clrMapOvr>
-    <a:masterClrMapping/>
-  </p:clrMapOvr>
-</p:sld>
-</file>
-
-<file path=ppt/slides/slide9.xml><?xml version="1.0" encoding="utf-8"?>
-<p:sld xmlns:a="http://schemas.openxmlformats.org/drawingml/2006/main" xmlns:p="http://schemas.openxmlformats.org/presentationml/2006/main" xmlns:r="http://schemas.openxmlformats.org/officeDocument/2006/relationships">
-  <p:cSld>
-    <p:spTree>
-      <p:nvGrpSpPr>
-        <p:cNvPr id="1" name=""/>
-        <p:cNvGrpSpPr/>
-        <p:nvPr/>
-      </p:nvGrpSpPr>
-      <p:grpSpPr/>
-      <p:sp>
-        <p:nvSpPr>
-          <p:cNvPr id="2" name="Title 1"/>
-          <p:cNvSpPr>
-            <a:spLocks noGrp="1"/>
-          </p:cNvSpPr>
-          <p:nvPr>
-            <p:ph type="title"/>
-          </p:nvPr>
-        </p:nvSpPr>
-        <p:spPr/>
-        <p:txBody>
-          <a:bodyPr/>
-          <a:lstStyle/>
-          <a:p>
-            <a:r>
-              <a:t>Leveraged Buyout Analysis</a:t>
-            </a:r>
-          </a:p>
-        </p:txBody>
-      </p:sp>
-      <p:sp>
-        <p:nvSpPr>
-          <p:cNvPr id="3" name="Text Placeholder 2"/>
-          <p:cNvSpPr>
-            <a:spLocks noGrp="1"/>
-          </p:cNvSpPr>
-          <p:nvPr>
-            <p:ph type="body" idx="14" sz="quarter"/>
-          </p:nvPr>
-        </p:nvSpPr>
-        <p:spPr/>
-        <p:txBody>
-          <a:bodyPr lIns="457200" tIns="228600" rIns="457200" bIns="228600"/>
-          <a:lstStyle/>
-          <a:p>
-            <a:pPr>
-              <a:spcBef>
-                <a:spcPts val="1000"/>
-              </a:spcBef>
-              <a:defRPr sz="1200"/>
-            </a:pPr>
-            <a:r>
-              <a:t>- **Definition**: Leveraged Buyout (LBO) involves acquiring a company using a significant amount of borrowed money.</a:t>
-            </a:r>
-          </a:p>
-          <a:p>
-            <a:pPr>
-              <a:spcBef>
-                <a:spcPts val="1000"/>
-              </a:spcBef>
-              <a:defRPr sz="1200"/>
-            </a:pPr>
-            <a:r>
-              <a:t>- **Key Components**: Purchase price, financing structure, projected financial performance, and exit strategy.</a:t>
-            </a:r>
-          </a:p>
-          <a:p>
-            <a:pPr>
-              <a:spcBef>
-                <a:spcPts val="1000"/>
-              </a:spcBef>
-              <a:defRPr sz="1200"/>
-            </a:pPr>
-            <a:r>
-              <a:t>- **Purchase Price**: Determined by valuation methods such as comparable company analysis, precedent transactions, and discounted cash flow (DCF).</a:t>
-            </a:r>
-          </a:p>
-          <a:p>
-            <a:pPr>
-              <a:spcBef>
-                <a:spcPts val="1000"/>
-              </a:spcBef>
-              <a:defRPr sz="1200"/>
-            </a:pPr>
-            <a:r>
-              <a:t>- **Financing Structure**: Typically includes a mix of debt and equity, with debt often comprising a large portion.</a:t>
-            </a:r>
-          </a:p>
-          <a:p>
-            <a:pPr>
-              <a:spcBef>
-                <a:spcPts val="1000"/>
-              </a:spcBef>
-              <a:defRPr sz="1200"/>
-            </a:pPr>
-            <a:r>
-              <a:t>- **Projected Financial Performance**: Involves forecasting revenue, expenses, and cash flows to assess the company's ability to service debt.</a:t>
-            </a:r>
-          </a:p>
-          <a:p>
-            <a:pPr>
-              <a:spcBef>
-                <a:spcPts val="1000"/>
-              </a:spcBef>
-              <a:defRPr sz="1200"/>
-            </a:pPr>
-            <a:r>
-              <a:t>- **Exit Strategy**: Common exit options include selling the company, taking it public, or recapitalization.</a:t>
-            </a:r>
-          </a:p>
-          <a:p>
-            <a:pPr>
-              <a:spcBef>
-                <a:spcPts val="1000"/>
-              </a:spcBef>
-              <a:defRPr sz="1200"/>
-            </a:pPr>
-            <a:r>
-              <a:t>- **Return Metrics**: Key metrics include Internal Rate of Return (IRR) and Multiple on Invested Capital (MOIC).</a:t>
-            </a:r>
-          </a:p>
-        </p:txBody>
-      </p:sp>
     </p:spTree>
   </p:cSld>
   <p:clrMapOvr>

</xml_diff>